<commit_message>
removed demos from m5, moved demo script to m1
</commit_message>
<xml_diff>
--- a/05.Hook into Apps for Office/05.Hook into Apps for Office.pptx
+++ b/05.Hook into Apps for Office/05.Hook into Apps for Office.pptx
@@ -182,10 +182,10 @@
       </p14:sectionLst>
     </p:ext>
     <p:ext uri="{EFAFB233-063F-42B5-8137-9DF3F51BA10A}">
-      <p15:sldGuideLst xmlns:p15="http://schemas.microsoft.com/office/powerpoint/2012/main"/>
+      <p15:sldGuideLst xmlns:p15="http://schemas.microsoft.com/office/powerpoint/2012/main" xmlns=""/>
     </p:ext>
     <p:ext uri="{2D200454-40CA-4A62-9FC3-DE9A4176ACB9}">
-      <p15:notesGuideLst xmlns:p15="http://schemas.microsoft.com/office/powerpoint/2012/main">
+      <p15:notesGuideLst xmlns:p15="http://schemas.microsoft.com/office/powerpoint/2012/main" xmlns="">
         <p15:guide id="1" orient="horz" pos="2880">
           <p15:clr>
             <a:srgbClr val="A4A3A4"/>
@@ -207,11 +207,7 @@
   <p:cmAuthor id="0" name="Saku Uchikawa" initials="SU" lastIdx="11" clrIdx="0"/>
   <p:cmAuthor id="1" name="Mary Feil-Jacobs" initials="MFJ" lastIdx="43" clrIdx="1"/>
   <p:cmAuthor id="2" name="Sanjeevini Mittal" initials="SM" lastIdx="1" clrIdx="2">
-    <p:extLst>
-      <p:ext uri="{19B8F6BF-5375-455C-9EA6-DF929625EA0E}">
-        <p15:presenceInfo xmlns:p15="http://schemas.microsoft.com/office/powerpoint/2012/main" userId="a25184d55ffa7663" providerId="Windows Live"/>
-      </p:ext>
-    </p:extLst>
+    <p:extLst/>
   </p:cmAuthor>
   <p:cmAuthor id="3" name="Author" initials="A" lastIdx="61" clrIdx="3"/>
 </p:cmAuthorLst>
@@ -270,7 +266,7 @@
               <a:rPr lang="en-US" smtClean="0">
                 <a:latin typeface="Segoe UI" pitchFamily="34" charset="0"/>
               </a:rPr>
-              <a:t>8/28/2014</a:t>
+              <a:t>9/9/14</a:t>
             </a:fld>
             <a:endParaRPr lang="en-US" dirty="0">
               <a:latin typeface="Segoe UI" pitchFamily="34" charset="0"/>
@@ -533,7 +529,7 @@
           <a:p>
             <a:fld id="{E74353ED-ACB2-44BF-A903-985B0AF962B7}" type="datetime1">
               <a:rPr lang="en-US" smtClean="0"/>
-              <a:t>8/28/2014</a:t>
+              <a:t>9/9/14</a:t>
             </a:fld>
             <a:endParaRPr lang="en-US" dirty="0"/>
           </a:p>
@@ -1049,7 +1045,7 @@
           <a:p>
             <a:fld id="{F520EA6B-12B9-470C-8032-CF7B89111BB8}" type="datetime1">
               <a:rPr lang="en-US" smtClean="0"/>
-              <a:t>8/28/2014</a:t>
+              <a:t>9/9/14</a:t>
             </a:fld>
             <a:endParaRPr lang="en-US"/>
           </a:p>
@@ -1271,7 +1267,7 @@
           <a:p>
             <a:fld id="{FC5F0E7A-DD5F-4903-B380-98FDBDD8F972}" type="datetime1">
               <a:rPr lang="en-US" smtClean="0"/>
-              <a:t>8/28/2014</a:t>
+              <a:t>9/9/14</a:t>
             </a:fld>
             <a:endParaRPr lang="en-US"/>
           </a:p>
@@ -1485,7 +1481,7 @@
           <a:p>
             <a:fld id="{64469F49-A1F5-4E7A-A41B-14BD8D8FB2E1}" type="datetime1">
               <a:rPr lang="en-US" smtClean="0"/>
-              <a:t>8/28/2014</a:t>
+              <a:t>9/9/14</a:t>
             </a:fld>
             <a:endParaRPr lang="en-US"/>
           </a:p>
@@ -1882,7 +1878,7 @@
           <a:p>
             <a:fld id="{68584938-3506-4DA6-B670-23FF647A9E8B}" type="datetime1">
               <a:rPr lang="en-US" smtClean="0"/>
-              <a:t>8/28/2014</a:t>
+              <a:t>9/9/14</a:t>
             </a:fld>
             <a:endParaRPr lang="en-US"/>
           </a:p>
@@ -2153,7 +2149,7 @@
           <a:p>
             <a:fld id="{05E1850F-7595-48D2-899E-D3C1304F8E26}" type="datetime1">
               <a:rPr lang="en-US" smtClean="0"/>
-              <a:t>8/28/2014</a:t>
+              <a:t>9/9/14</a:t>
             </a:fld>
             <a:endParaRPr lang="en-US"/>
           </a:p>
@@ -2734,7 +2730,7 @@
           <a:p>
             <a:fld id="{B079C3B8-7366-4A44-A34B-3977080C19E7}" type="datetime1">
               <a:rPr lang="en-US" smtClean="0"/>
-              <a:t>8/28/2014</a:t>
+              <a:t>9/9/14</a:t>
             </a:fld>
             <a:endParaRPr lang="en-US" dirty="0"/>
           </a:p>
@@ -2919,7 +2915,7 @@
           <a:p>
             <a:fld id="{E74353ED-ACB2-44BF-A903-985B0AF962B7}" type="datetime1">
               <a:rPr lang="en-US" smtClean="0"/>
-              <a:t>8/28/2014</a:t>
+              <a:t>9/9/14</a:t>
             </a:fld>
             <a:endParaRPr lang="en-US" dirty="0"/>
           </a:p>
@@ -3081,7 +3077,7 @@
           <a:p>
             <a:fld id="{B079C3B8-7366-4A44-A34B-3977080C19E7}" type="datetime1">
               <a:rPr lang="en-US" smtClean="0"/>
-              <a:t>8/28/2014</a:t>
+              <a:t>9/9/14</a:t>
             </a:fld>
             <a:endParaRPr lang="en-US" dirty="0"/>
           </a:p>
@@ -3323,7 +3319,7 @@
           <a:p>
             <a:fld id="{0BB6559B-C68D-49B4-97AE-9BB74C417927}" type="datetime1">
               <a:rPr lang="en-US" smtClean="0"/>
-              <a:t>8/28/2014</a:t>
+              <a:t>9/9/14</a:t>
             </a:fld>
             <a:endParaRPr lang="en-US"/>
           </a:p>
@@ -3486,7 +3482,7 @@
           <a:p>
             <a:fld id="{015232D4-6E30-4A26-A2CA-8531DCB72EA6}" type="datetime1">
               <a:rPr lang="en-US" smtClean="0"/>
-              <a:t>8/28/2014</a:t>
+              <a:t>9/9/14</a:t>
             </a:fld>
             <a:endParaRPr lang="en-US"/>
           </a:p>
@@ -3866,7 +3862,7 @@
           <a:p>
             <a:fld id="{9FEEF74C-1007-402E-B0A6-22E0FEB3AB9E}" type="datetime1">
               <a:rPr lang="en-US" smtClean="0"/>
-              <a:t>8/28/2014</a:t>
+              <a:t>9/9/14</a:t>
             </a:fld>
             <a:endParaRPr lang="en-US"/>
           </a:p>
@@ -4099,7 +4095,7 @@
           <a:p>
             <a:fld id="{0963315D-FADD-47D1-B04E-85DCA5AF53D6}" type="datetime1">
               <a:rPr lang="en-US" smtClean="0"/>
-              <a:t>8/28/2014</a:t>
+              <a:t>9/9/14</a:t>
             </a:fld>
             <a:endParaRPr lang="en-US"/>
           </a:p>
@@ -4341,7 +4337,7 @@
           <a:p>
             <a:fld id="{F158C575-4F53-44CC-8D6E-CAE5944D2CEA}" type="datetime1">
               <a:rPr lang="en-US" smtClean="0"/>
-              <a:t>8/28/2014</a:t>
+              <a:t>9/9/14</a:t>
             </a:fld>
             <a:endParaRPr lang="en-US"/>
           </a:p>
@@ -4629,7 +4625,7 @@
           <a:p>
             <a:fld id="{520542AC-2E5E-4BC8-BBEE-E2E42C12BB55}" type="datetime1">
               <a:rPr lang="en-US" smtClean="0"/>
-              <a:t>8/28/2014</a:t>
+              <a:t>9/9/14</a:t>
             </a:fld>
             <a:endParaRPr lang="en-US"/>
           </a:p>
@@ -5046,7 +5042,7 @@
   <p:timing>
     <p:tnLst>
       <p:par>
-        <p:cTn id="1" dur="indefinite" restart="never" nodeType="tmRoot"/>
+        <p:cTn xmlns:p14="http://schemas.microsoft.com/office/powerpoint/2010/main" id="1" dur="indefinite" restart="never" nodeType="tmRoot"/>
       </p:par>
     </p:tnLst>
   </p:timing>
@@ -5414,7 +5410,7 @@
   <p:timing>
     <p:tnLst>
       <p:par>
-        <p:cTn id="1" dur="indefinite" restart="never" nodeType="tmRoot"/>
+        <p:cTn xmlns:p14="http://schemas.microsoft.com/office/powerpoint/2010/main" id="1" dur="indefinite" restart="never" nodeType="tmRoot"/>
       </p:par>
     </p:tnLst>
   </p:timing>
@@ -5782,7 +5778,7 @@
   <p:timing>
     <p:tnLst>
       <p:par>
-        <p:cTn id="1" dur="indefinite" restart="never" nodeType="tmRoot"/>
+        <p:cTn xmlns:p14="http://schemas.microsoft.com/office/powerpoint/2010/main" id="1" dur="indefinite" restart="never" nodeType="tmRoot"/>
       </p:par>
     </p:tnLst>
   </p:timing>
@@ -6155,7 +6151,7 @@
   <p:timing>
     <p:tnLst>
       <p:par>
-        <p:cTn id="1" dur="indefinite" restart="never" nodeType="tmRoot"/>
+        <p:cTn xmlns:p14="http://schemas.microsoft.com/office/powerpoint/2010/main" id="1" dur="indefinite" restart="never" nodeType="tmRoot"/>
       </p:par>
     </p:tnLst>
   </p:timing>
@@ -6455,7 +6451,7 @@
   <p:timing>
     <p:tnLst>
       <p:par>
-        <p:cTn id="1" dur="indefinite" restart="never" nodeType="tmRoot"/>
+        <p:cTn xmlns:p14="http://schemas.microsoft.com/office/powerpoint/2010/main" id="1" dur="indefinite" restart="never" nodeType="tmRoot"/>
       </p:par>
     </p:tnLst>
   </p:timing>
@@ -6794,7 +6790,7 @@
   <p:timing>
     <p:tnLst>
       <p:par>
-        <p:cTn id="1" dur="indefinite" restart="never" nodeType="tmRoot"/>
+        <p:cTn xmlns:p14="http://schemas.microsoft.com/office/powerpoint/2010/main" id="1" dur="indefinite" restart="never" nodeType="tmRoot"/>
       </p:par>
     </p:tnLst>
   </p:timing>
@@ -7167,7 +7163,7 @@
   <p:timing>
     <p:tnLst>
       <p:par>
-        <p:cTn id="1" dur="indefinite" restart="never" nodeType="tmRoot"/>
+        <p:cTn xmlns:p14="http://schemas.microsoft.com/office/powerpoint/2010/main" id="1" dur="indefinite" restart="never" nodeType="tmRoot"/>
       </p:par>
     </p:tnLst>
   </p:timing>
@@ -7540,7 +7536,7 @@
   <p:timing>
     <p:tnLst>
       <p:par>
-        <p:cTn id="1" dur="indefinite" restart="never" nodeType="tmRoot"/>
+        <p:cTn xmlns:p14="http://schemas.microsoft.com/office/powerpoint/2010/main" id="1" dur="indefinite" restart="never" nodeType="tmRoot"/>
       </p:par>
     </p:tnLst>
   </p:timing>
@@ -8263,7 +8259,7 @@
   <p:timing>
     <p:tnLst>
       <p:par>
-        <p:cTn id="1" dur="indefinite" restart="never" nodeType="tmRoot"/>
+        <p:cTn xmlns:p14="http://schemas.microsoft.com/office/powerpoint/2010/main" id="1" dur="indefinite" restart="never" nodeType="tmRoot"/>
       </p:par>
     </p:tnLst>
   </p:timing>
@@ -8444,12 +8440,12 @@
   <p:clrMapOvr>
     <a:masterClrMapping/>
   </p:clrMapOvr>
-  <p:transition>
+  <p:transition xmlns:p14="http://schemas.microsoft.com/office/powerpoint/2010/main">
     <p:fade/>
   </p:transition>
   <p:extLst>
     <p:ext uri="{DCECCB84-F9BA-43D5-87BE-67443E8EF086}">
-      <p15:sldGuideLst xmlns:p15="http://schemas.microsoft.com/office/powerpoint/2012/main">
+      <p15:sldGuideLst xmlns:p15="http://schemas.microsoft.com/office/powerpoint/2012/main" xmlns="">
         <p15:guide id="1" pos="288" userDrawn="1">
           <p15:clr>
             <a:srgbClr val="5ACBF0"/>
@@ -8585,13 +8581,13 @@
   <p:clrMapOvr>
     <a:masterClrMapping/>
   </p:clrMapOvr>
-  <p:transition>
+  <p:transition xmlns:p14="http://schemas.microsoft.com/office/powerpoint/2010/main">
     <p:fade/>
   </p:transition>
   <p:timing>
     <p:tnLst>
       <p:par>
-        <p:cTn id="1" dur="indefinite" restart="never" nodeType="tmRoot"/>
+        <p:cTn xmlns:p14="http://schemas.microsoft.com/office/powerpoint/2010/main" id="1" dur="indefinite" restart="never" nodeType="tmRoot"/>
       </p:par>
     </p:tnLst>
   </p:timing>
@@ -8625,13 +8621,13 @@
   <p:clrMapOvr>
     <a:masterClrMapping/>
   </p:clrMapOvr>
-  <p:transition>
+  <p:transition xmlns:p14="http://schemas.microsoft.com/office/powerpoint/2010/main">
     <p:fade/>
   </p:transition>
   <p:timing>
     <p:tnLst>
       <p:par>
-        <p:cTn id="1" dur="indefinite" restart="never" nodeType="tmRoot"/>
+        <p:cTn xmlns:p14="http://schemas.microsoft.com/office/powerpoint/2010/main" id="1" dur="indefinite" restart="never" nodeType="tmRoot"/>
       </p:par>
     </p:tnLst>
   </p:timing>
@@ -8940,7 +8936,7 @@
   <p:clrMapOvr>
     <a:masterClrMapping/>
   </p:clrMapOvr>
-  <p:transition>
+  <p:transition xmlns:p14="http://schemas.microsoft.com/office/powerpoint/2010/main">
     <p:fade/>
   </p:transition>
 </p:sldLayout>
@@ -9052,13 +9048,13 @@
   <p:clrMapOvr>
     <a:masterClrMapping/>
   </p:clrMapOvr>
-  <p:transition>
+  <p:transition xmlns:p14="http://schemas.microsoft.com/office/powerpoint/2010/main">
     <p:fade/>
   </p:transition>
   <p:timing>
     <p:tnLst>
       <p:par>
-        <p:cTn id="1" dur="indefinite" restart="never" nodeType="tmRoot">
+        <p:cTn xmlns:p14="http://schemas.microsoft.com/office/powerpoint/2010/main" id="1" dur="indefinite" restart="never" nodeType="tmRoot">
           <p:childTnLst>
             <p:seq concurrent="1" nextAc="seek">
               <p:cTn id="2" dur="indefinite" nodeType="mainSeq">
@@ -9514,13 +9510,13 @@
   <p:clrMapOvr>
     <a:masterClrMapping/>
   </p:clrMapOvr>
-  <p:transition>
+  <p:transition xmlns:p14="http://schemas.microsoft.com/office/powerpoint/2010/main">
     <p:fade/>
   </p:transition>
   <p:timing>
     <p:tnLst>
       <p:par>
-        <p:cTn id="1" dur="indefinite" restart="never" nodeType="tmRoot"/>
+        <p:cTn xmlns:p14="http://schemas.microsoft.com/office/powerpoint/2010/main" id="1" dur="indefinite" restart="never" nodeType="tmRoot"/>
       </p:par>
     </p:tnLst>
   </p:timing>
@@ -9769,13 +9765,13 @@
   <p:clrMapOvr>
     <a:masterClrMapping/>
   </p:clrMapOvr>
-  <p:transition>
+  <p:transition xmlns:p14="http://schemas.microsoft.com/office/powerpoint/2010/main">
     <p:fade/>
   </p:transition>
   <p:timing>
     <p:tnLst>
       <p:par>
-        <p:cTn id="1" dur="indefinite" restart="never" nodeType="tmRoot"/>
+        <p:cTn xmlns:p14="http://schemas.microsoft.com/office/powerpoint/2010/main" id="1" dur="indefinite" restart="never" nodeType="tmRoot"/>
       </p:par>
     </p:tnLst>
   </p:timing>
@@ -10055,13 +10051,13 @@
   <p:clrMapOvr>
     <a:masterClrMapping/>
   </p:clrMapOvr>
-  <p:transition>
+  <p:transition xmlns:p14="http://schemas.microsoft.com/office/powerpoint/2010/main">
     <p:fade/>
   </p:transition>
   <p:timing>
     <p:tnLst>
       <p:par>
-        <p:cTn id="1" dur="indefinite" restart="never" nodeType="tmRoot"/>
+        <p:cTn xmlns:p14="http://schemas.microsoft.com/office/powerpoint/2010/main" id="1" dur="indefinite" restart="never" nodeType="tmRoot"/>
       </p:par>
     </p:tnLst>
   </p:timing>
@@ -10476,19 +10472,19 @@
   <p:clrMapOvr>
     <a:masterClrMapping/>
   </p:clrMapOvr>
-  <p:transition>
+  <p:transition xmlns:p14="http://schemas.microsoft.com/office/powerpoint/2010/main">
     <p:fade/>
   </p:transition>
   <p:timing>
     <p:tnLst>
       <p:par>
-        <p:cTn id="1" dur="indefinite" restart="never" nodeType="tmRoot"/>
+        <p:cTn xmlns:p14="http://schemas.microsoft.com/office/powerpoint/2010/main" id="1" dur="indefinite" restart="never" nodeType="tmRoot"/>
       </p:par>
     </p:tnLst>
   </p:timing>
   <p:extLst mod="1">
     <p:ext uri="{DCECCB84-F9BA-43D5-87BE-67443E8EF086}">
-      <p15:sldGuideLst xmlns:p15="http://schemas.microsoft.com/office/powerpoint/2012/main">
+      <p15:sldGuideLst xmlns:p15="http://schemas.microsoft.com/office/powerpoint/2012/main" xmlns="">
         <p15:guide id="1" orient="horz" pos="2203">
           <p15:clr>
             <a:srgbClr val="FBAE40"/>
@@ -10540,7 +10536,7 @@
   <p:clrMapOvr>
     <a:masterClrMapping/>
   </p:clrMapOvr>
-  <p:transition>
+  <p:transition xmlns:p14="http://schemas.microsoft.com/office/powerpoint/2010/main">
     <p:fade/>
   </p:transition>
 </p:sldLayout>
@@ -10596,13 +10592,13 @@
   <p:clrMapOvr>
     <a:masterClrMapping/>
   </p:clrMapOvr>
-  <p:transition>
+  <p:transition xmlns:p14="http://schemas.microsoft.com/office/powerpoint/2010/main">
     <p:fade/>
   </p:transition>
   <p:timing>
     <p:tnLst>
       <p:par>
-        <p:cTn id="1" dur="indefinite" restart="never" nodeType="tmRoot"/>
+        <p:cTn xmlns:p14="http://schemas.microsoft.com/office/powerpoint/2010/main" id="1" dur="indefinite" restart="never" nodeType="tmRoot"/>
       </p:par>
     </p:tnLst>
   </p:timing>
@@ -10718,13 +10714,13 @@
   <p:clrMapOvr>
     <a:masterClrMapping/>
   </p:clrMapOvr>
-  <p:transition>
+  <p:transition xmlns:p14="http://schemas.microsoft.com/office/powerpoint/2010/main">
     <p:fade/>
   </p:transition>
   <p:timing>
     <p:tnLst>
       <p:par>
-        <p:cTn id="1" dur="indefinite" restart="never" nodeType="tmRoot"/>
+        <p:cTn xmlns:p14="http://schemas.microsoft.com/office/powerpoint/2010/main" id="1" dur="indefinite" restart="never" nodeType="tmRoot"/>
       </p:par>
     </p:tnLst>
   </p:timing>
@@ -11027,7 +11023,7 @@
   <p:timing>
     <p:tnLst>
       <p:par>
-        <p:cTn id="1" dur="indefinite" restart="never" nodeType="tmRoot"/>
+        <p:cTn xmlns:p14="http://schemas.microsoft.com/office/powerpoint/2010/main" id="1" dur="indefinite" restart="never" nodeType="tmRoot"/>
       </p:par>
     </p:tnLst>
   </p:timing>
@@ -11061,7 +11057,7 @@
   <p:clrMapOvr>
     <a:masterClrMapping/>
   </p:clrMapOvr>
-  <p:transition>
+  <p:transition xmlns:p14="http://schemas.microsoft.com/office/powerpoint/2010/main">
     <p:fade/>
   </p:transition>
 </p:sldLayout>
@@ -11351,13 +11347,13 @@
   <p:clrMapOvr>
     <a:masterClrMapping/>
   </p:clrMapOvr>
-  <p:transition>
+  <p:transition xmlns:p14="http://schemas.microsoft.com/office/powerpoint/2010/main">
     <p:fade/>
   </p:transition>
   <p:timing>
     <p:tnLst>
       <p:par>
-        <p:cTn id="1" dur="indefinite" restart="never" nodeType="tmRoot"/>
+        <p:cTn xmlns:p14="http://schemas.microsoft.com/office/powerpoint/2010/main" id="1" dur="indefinite" restart="never" nodeType="tmRoot"/>
       </p:par>
     </p:tnLst>
   </p:timing>
@@ -11500,7 +11496,7 @@
   <p:timing>
     <p:tnLst>
       <p:par>
-        <p:cTn id="1" dur="indefinite" restart="never" nodeType="tmRoot"/>
+        <p:cTn xmlns:p14="http://schemas.microsoft.com/office/powerpoint/2010/main" id="1" dur="indefinite" restart="never" nodeType="tmRoot"/>
       </p:par>
     </p:tnLst>
   </p:timing>
@@ -11966,7 +11962,7 @@
   <p:timing>
     <p:tnLst>
       <p:par>
-        <p:cTn id="1" dur="indefinite" restart="never" nodeType="tmRoot"/>
+        <p:cTn xmlns:p14="http://schemas.microsoft.com/office/powerpoint/2010/main" id="1" dur="indefinite" restart="never" nodeType="tmRoot"/>
       </p:par>
     </p:tnLst>
   </p:timing>
@@ -12149,7 +12145,7 @@
   <p:timing>
     <p:tnLst>
       <p:par>
-        <p:cTn id="1" dur="indefinite" restart="never" nodeType="tmRoot"/>
+        <p:cTn xmlns:p14="http://schemas.microsoft.com/office/powerpoint/2010/main" id="1" dur="indefinite" restart="never" nodeType="tmRoot"/>
       </p:par>
     </p:tnLst>
   </p:timing>
@@ -12428,13 +12424,13 @@
   <p:clrMapOvr>
     <a:masterClrMapping/>
   </p:clrMapOvr>
-  <p:transition>
+  <p:transition xmlns:p14="http://schemas.microsoft.com/office/powerpoint/2010/main">
     <p:fade/>
   </p:transition>
   <p:timing>
     <p:tnLst>
       <p:par>
-        <p:cTn id="1" dur="indefinite" restart="never" nodeType="tmRoot"/>
+        <p:cTn xmlns:p14="http://schemas.microsoft.com/office/powerpoint/2010/main" id="1" dur="indefinite" restart="never" nodeType="tmRoot"/>
       </p:par>
     </p:tnLst>
   </p:timing>
@@ -12683,13 +12679,13 @@
   <p:clrMapOvr>
     <a:masterClrMapping/>
   </p:clrMapOvr>
-  <p:transition>
+  <p:transition xmlns:p14="http://schemas.microsoft.com/office/powerpoint/2010/main">
     <p:fade/>
   </p:transition>
   <p:timing>
     <p:tnLst>
       <p:par>
-        <p:cTn id="1" dur="indefinite" restart="never" nodeType="tmRoot"/>
+        <p:cTn xmlns:p14="http://schemas.microsoft.com/office/powerpoint/2010/main" id="1" dur="indefinite" restart="never" nodeType="tmRoot"/>
       </p:par>
     </p:tnLst>
   </p:timing>
@@ -12897,13 +12893,13 @@
   <p:clrMapOvr>
     <a:masterClrMapping/>
   </p:clrMapOvr>
-  <p:transition>
+  <p:transition xmlns:p14="http://schemas.microsoft.com/office/powerpoint/2010/main">
     <p:fade/>
   </p:transition>
   <p:timing>
     <p:tnLst>
       <p:par>
-        <p:cTn id="1" dur="indefinite" restart="never" nodeType="tmRoot"/>
+        <p:cTn xmlns:p14="http://schemas.microsoft.com/office/powerpoint/2010/main" id="1" dur="indefinite" restart="never" nodeType="tmRoot"/>
       </p:par>
     </p:tnLst>
   </p:timing>
@@ -13125,13 +13121,13 @@
   <p:clrMapOvr>
     <a:masterClrMapping/>
   </p:clrMapOvr>
-  <p:transition>
+  <p:transition xmlns:p14="http://schemas.microsoft.com/office/powerpoint/2010/main">
     <p:fade/>
   </p:transition>
   <p:timing>
     <p:tnLst>
       <p:par>
-        <p:cTn id="1" dur="indefinite" restart="never" nodeType="tmRoot"/>
+        <p:cTn xmlns:p14="http://schemas.microsoft.com/office/powerpoint/2010/main" id="1" dur="indefinite" restart="never" nodeType="tmRoot"/>
       </p:par>
     </p:tnLst>
   </p:timing>
@@ -13381,13 +13377,13 @@
   <p:clrMapOvr>
     <a:masterClrMapping/>
   </p:clrMapOvr>
-  <p:transition>
+  <p:transition xmlns:p14="http://schemas.microsoft.com/office/powerpoint/2010/main">
     <p:fade/>
   </p:transition>
   <p:timing>
     <p:tnLst>
       <p:par>
-        <p:cTn id="1" dur="indefinite" restart="never" nodeType="tmRoot"/>
+        <p:cTn xmlns:p14="http://schemas.microsoft.com/office/powerpoint/2010/main" id="1" dur="indefinite" restart="never" nodeType="tmRoot"/>
       </p:par>
     </p:tnLst>
   </p:timing>
@@ -13709,13 +13705,13 @@
   <p:clrMapOvr>
     <a:masterClrMapping/>
   </p:clrMapOvr>
-  <p:transition>
+  <p:transition xmlns:p14="http://schemas.microsoft.com/office/powerpoint/2010/main">
     <p:fade/>
   </p:transition>
   <p:timing>
     <p:tnLst>
       <p:par>
-        <p:cTn id="1" dur="indefinite" restart="never" nodeType="tmRoot"/>
+        <p:cTn xmlns:p14="http://schemas.microsoft.com/office/powerpoint/2010/main" id="1" dur="indefinite" restart="never" nodeType="tmRoot"/>
       </p:par>
     </p:tnLst>
   </p:timing>
@@ -13939,13 +13935,13 @@
   <p:clrMapOvr>
     <a:masterClrMapping/>
   </p:clrMapOvr>
-  <p:transition>
+  <p:transition xmlns:p14="http://schemas.microsoft.com/office/powerpoint/2010/main">
     <p:fade/>
   </p:transition>
   <p:timing>
     <p:tnLst>
       <p:par>
-        <p:cTn id="1" dur="indefinite" restart="never" nodeType="tmRoot"/>
+        <p:cTn xmlns:p14="http://schemas.microsoft.com/office/powerpoint/2010/main" id="1" dur="indefinite" restart="never" nodeType="tmRoot"/>
       </p:par>
     </p:tnLst>
   </p:timing>
@@ -14187,13 +14183,13 @@
   <p:clrMapOvr>
     <a:masterClrMapping/>
   </p:clrMapOvr>
-  <p:transition>
+  <p:transition xmlns:p14="http://schemas.microsoft.com/office/powerpoint/2010/main">
     <p:fade/>
   </p:transition>
   <p:timing>
     <p:tnLst>
       <p:par>
-        <p:cTn id="1" dur="indefinite" restart="never" nodeType="tmRoot"/>
+        <p:cTn xmlns:p14="http://schemas.microsoft.com/office/powerpoint/2010/main" id="1" dur="indefinite" restart="never" nodeType="tmRoot"/>
       </p:par>
     </p:tnLst>
   </p:timing>
@@ -14400,13 +14396,13 @@
   <p:clrMapOvr>
     <a:masterClrMapping/>
   </p:clrMapOvr>
-  <p:transition>
+  <p:transition xmlns:p14="http://schemas.microsoft.com/office/powerpoint/2010/main">
     <p:fade/>
   </p:transition>
   <p:timing>
     <p:tnLst>
       <p:par>
-        <p:cTn id="1" dur="indefinite" restart="never" nodeType="tmRoot"/>
+        <p:cTn xmlns:p14="http://schemas.microsoft.com/office/powerpoint/2010/main" id="1" dur="indefinite" restart="never" nodeType="tmRoot"/>
       </p:par>
     </p:tnLst>
   </p:timing>
@@ -14441,13 +14437,13 @@
   <p:clrMapOvr>
     <a:masterClrMapping/>
   </p:clrMapOvr>
-  <p:transition>
+  <p:transition xmlns:p14="http://schemas.microsoft.com/office/powerpoint/2010/main">
     <p:fade/>
   </p:transition>
   <p:timing>
     <p:tnLst>
       <p:par>
-        <p:cTn id="1" dur="indefinite" restart="never" nodeType="tmRoot"/>
+        <p:cTn xmlns:p14="http://schemas.microsoft.com/office/powerpoint/2010/main" id="1" dur="indefinite" restart="never" nodeType="tmRoot"/>
       </p:par>
     </p:tnLst>
   </p:timing>
@@ -14727,13 +14723,13 @@
   <p:clrMapOvr>
     <a:masterClrMapping/>
   </p:clrMapOvr>
-  <p:transition>
+  <p:transition xmlns:p14="http://schemas.microsoft.com/office/powerpoint/2010/main">
     <p:fade/>
   </p:transition>
   <p:timing>
     <p:tnLst>
       <p:par>
-        <p:cTn id="1" dur="indefinite" restart="never" nodeType="tmRoot"/>
+        <p:cTn xmlns:p14="http://schemas.microsoft.com/office/powerpoint/2010/main" id="1" dur="indefinite" restart="never" nodeType="tmRoot"/>
       </p:par>
     </p:tnLst>
   </p:timing>
@@ -14854,7 +14850,7 @@
   <p:timing>
     <p:tnLst>
       <p:par>
-        <p:cTn id="1" dur="indefinite" restart="never" nodeType="tmRoot"/>
+        <p:cTn xmlns:p14="http://schemas.microsoft.com/office/powerpoint/2010/main" id="1" dur="indefinite" restart="never" nodeType="tmRoot"/>
       </p:par>
     </p:tnLst>
   </p:timing>
@@ -14896,13 +14892,13 @@
   <p:clrMapOvr>
     <a:masterClrMapping/>
   </p:clrMapOvr>
-  <p:transition>
+  <p:transition xmlns:p14="http://schemas.microsoft.com/office/powerpoint/2010/main">
     <p:fade/>
   </p:transition>
   <p:timing>
     <p:tnLst>
       <p:par>
-        <p:cTn id="1" dur="indefinite" restart="never" nodeType="tmRoot"/>
+        <p:cTn xmlns:p14="http://schemas.microsoft.com/office/powerpoint/2010/main" id="1" dur="indefinite" restart="never" nodeType="tmRoot"/>
       </p:par>
     </p:tnLst>
   </p:timing>
@@ -15060,13 +15056,13 @@
   <p:clrMapOvr>
     <a:masterClrMapping/>
   </p:clrMapOvr>
-  <p:transition>
+  <p:transition xmlns:p14="http://schemas.microsoft.com/office/powerpoint/2010/main">
     <p:fade/>
   </p:transition>
   <p:timing>
     <p:tnLst>
       <p:par>
-        <p:cTn id="1" dur="indefinite" restart="never" nodeType="tmRoot"/>
+        <p:cTn xmlns:p14="http://schemas.microsoft.com/office/powerpoint/2010/main" id="1" dur="indefinite" restart="never" nodeType="tmRoot"/>
       </p:par>
     </p:tnLst>
   </p:timing>
@@ -15330,7 +15326,7 @@
   <p:timing>
     <p:tnLst>
       <p:par>
-        <p:cTn id="1" dur="indefinite" restart="never" nodeType="tmRoot"/>
+        <p:cTn xmlns:p14="http://schemas.microsoft.com/office/powerpoint/2010/main" id="1" dur="indefinite" restart="never" nodeType="tmRoot"/>
       </p:par>
     </p:tnLst>
   </p:timing>
@@ -15594,7 +15590,7 @@
   <p:timing>
     <p:tnLst>
       <p:par>
-        <p:cTn id="1" dur="indefinite" restart="never" nodeType="tmRoot"/>
+        <p:cTn xmlns:p14="http://schemas.microsoft.com/office/powerpoint/2010/main" id="1" dur="indefinite" restart="never" nodeType="tmRoot"/>
       </p:par>
     </p:tnLst>
   </p:timing>
@@ -15915,13 +15911,13 @@
   <p:clrMapOvr>
     <a:masterClrMapping/>
   </p:clrMapOvr>
-  <p:transition>
+  <p:transition xmlns:p14="http://schemas.microsoft.com/office/powerpoint/2010/main">
     <p:fade/>
   </p:transition>
   <p:timing>
     <p:tnLst>
       <p:par>
-        <p:cTn id="1" dur="indefinite" restart="never" nodeType="tmRoot"/>
+        <p:cTn xmlns:p14="http://schemas.microsoft.com/office/powerpoint/2010/main" id="1" dur="indefinite" restart="never" nodeType="tmRoot"/>
       </p:par>
     </p:tnLst>
   </p:timing>
@@ -16185,7 +16181,7 @@
   <p:timing>
     <p:tnLst>
       <p:par>
-        <p:cTn id="1" dur="indefinite" restart="never" nodeType="tmRoot"/>
+        <p:cTn xmlns:p14="http://schemas.microsoft.com/office/powerpoint/2010/main" id="1" dur="indefinite" restart="never" nodeType="tmRoot"/>
       </p:par>
     </p:tnLst>
   </p:timing>
@@ -16449,7 +16445,7 @@
   <p:timing>
     <p:tnLst>
       <p:par>
-        <p:cTn id="1" dur="indefinite" restart="never" nodeType="tmRoot"/>
+        <p:cTn xmlns:p14="http://schemas.microsoft.com/office/powerpoint/2010/main" id="1" dur="indefinite" restart="never" nodeType="tmRoot"/>
       </p:par>
     </p:tnLst>
   </p:timing>
@@ -16713,7 +16709,7 @@
   <p:timing>
     <p:tnLst>
       <p:par>
-        <p:cTn id="1" dur="indefinite" restart="never" nodeType="tmRoot"/>
+        <p:cTn xmlns:p14="http://schemas.microsoft.com/office/powerpoint/2010/main" id="1" dur="indefinite" restart="never" nodeType="tmRoot"/>
       </p:par>
     </p:tnLst>
   </p:timing>
@@ -17139,19 +17135,19 @@
   <p:clrMapOvr>
     <a:masterClrMapping/>
   </p:clrMapOvr>
-  <p:transition>
+  <p:transition xmlns:p14="http://schemas.microsoft.com/office/powerpoint/2010/main">
     <p:fade/>
   </p:transition>
   <p:timing>
     <p:tnLst>
       <p:par>
-        <p:cTn id="1" dur="indefinite" restart="never" nodeType="tmRoot"/>
+        <p:cTn xmlns:p14="http://schemas.microsoft.com/office/powerpoint/2010/main" id="1" dur="indefinite" restart="never" nodeType="tmRoot"/>
       </p:par>
     </p:tnLst>
   </p:timing>
   <p:extLst mod="1">
     <p:ext uri="{DCECCB84-F9BA-43D5-87BE-67443E8EF086}">
-      <p15:sldGuideLst xmlns:p15="http://schemas.microsoft.com/office/powerpoint/2012/main">
+      <p15:sldGuideLst xmlns:p15="http://schemas.microsoft.com/office/powerpoint/2012/main" xmlns="">
         <p15:guide id="1" orient="horz" pos="2203">
           <p15:clr>
             <a:srgbClr val="FBAE40"/>
@@ -17438,13 +17434,13 @@
   <p:clrMapOvr>
     <a:masterClrMapping/>
   </p:clrMapOvr>
-  <p:transition>
+  <p:transition xmlns:p14="http://schemas.microsoft.com/office/powerpoint/2010/main">
     <p:fade/>
   </p:transition>
   <p:timing>
     <p:tnLst>
       <p:par>
-        <p:cTn id="1" dur="indefinite" restart="never" nodeType="tmRoot"/>
+        <p:cTn xmlns:p14="http://schemas.microsoft.com/office/powerpoint/2010/main" id="1" dur="indefinite" restart="never" nodeType="tmRoot"/>
       </p:par>
     </p:tnLst>
   </p:timing>
@@ -17997,13 +17993,13 @@
   <p:clrMapOvr>
     <a:masterClrMapping/>
   </p:clrMapOvr>
-  <p:transition>
+  <p:transition xmlns:p14="http://schemas.microsoft.com/office/powerpoint/2010/main">
     <p:fade/>
   </p:transition>
   <p:timing>
     <p:tnLst>
       <p:par>
-        <p:cTn id="1" dur="indefinite" restart="never" nodeType="tmRoot"/>
+        <p:cTn xmlns:p14="http://schemas.microsoft.com/office/powerpoint/2010/main" id="1" dur="indefinite" restart="never" nodeType="tmRoot"/>
       </p:par>
     </p:tnLst>
   </p:timing>
@@ -18604,7 +18600,7 @@
   <p:clrMapOvr>
     <a:masterClrMapping/>
   </p:clrMapOvr>
-  <p:transition>
+  <p:transition xmlns:p14="http://schemas.microsoft.com/office/powerpoint/2010/main">
     <p:fade/>
   </p:transition>
 </p:sldLayout>
@@ -19123,7 +19119,7 @@
   <p:clrMapOvr>
     <a:masterClrMapping/>
   </p:clrMapOvr>
-  <p:transition>
+  <p:transition xmlns:p14="http://schemas.microsoft.com/office/powerpoint/2010/main">
     <p:fade/>
   </p:transition>
 </p:sldLayout>
@@ -19283,13 +19279,13 @@
     <p:sldLayoutId id="2147484557" r:id="rId26"/>
     <p:sldLayoutId id="2147484558" r:id="rId27"/>
   </p:sldLayoutIdLst>
-  <p:transition>
+  <p:transition xmlns:p14="http://schemas.microsoft.com/office/powerpoint/2010/main">
     <p:fade/>
   </p:transition>
   <p:timing>
     <p:tnLst>
       <p:par>
-        <p:cTn id="1" dur="indefinite" restart="never" nodeType="tmRoot"/>
+        <p:cTn xmlns:p14="http://schemas.microsoft.com/office/powerpoint/2010/main" id="1" dur="indefinite" restart="never" nodeType="tmRoot"/>
       </p:par>
     </p:tnLst>
   </p:timing>
@@ -19650,7 +19646,7 @@
   </p:txStyles>
   <p:extLst>
     <p:ext uri="{27BBF7A9-308A-43DC-89C8-2F10F3537804}">
-      <p15:sldGuideLst xmlns:p15="http://schemas.microsoft.com/office/powerpoint/2012/main">
+      <p15:sldGuideLst xmlns:p15="http://schemas.microsoft.com/office/powerpoint/2012/main" xmlns="">
         <p15:guide id="1" pos="173" userDrawn="1">
           <p15:clr>
             <a:srgbClr val="000000"/>
@@ -19948,13 +19944,13 @@
   <p:sldLayoutIdLst>
     <p:sldLayoutId id="2147484477" r:id="rId1"/>
   </p:sldLayoutIdLst>
-  <p:transition>
+  <p:transition xmlns:p14="http://schemas.microsoft.com/office/powerpoint/2010/main">
     <p:fade/>
   </p:transition>
   <p:timing>
     <p:tnLst>
       <p:par>
-        <p:cTn id="1" dur="indefinite" restart="never" nodeType="tmRoot"/>
+        <p:cTn xmlns:p14="http://schemas.microsoft.com/office/powerpoint/2010/main" id="1" dur="indefinite" restart="never" nodeType="tmRoot"/>
       </p:par>
     </p:tnLst>
   </p:timing>
@@ -20330,7 +20326,7 @@
   </p:txStyles>
   <p:extLst mod="1">
     <p:ext uri="{27BBF7A9-308A-43DC-89C8-2F10F3537804}">
-      <p15:sldGuideLst xmlns:p15="http://schemas.microsoft.com/office/powerpoint/2012/main">
+      <p15:sldGuideLst xmlns:p15="http://schemas.microsoft.com/office/powerpoint/2012/main" xmlns="">
         <p15:guide id="1" orient="horz" pos="187">
           <p15:clr>
             <a:srgbClr val="5ACBF0"/>
@@ -20603,13 +20599,13 @@
     <p:sldLayoutId id="2147484533" r:id="rId8"/>
     <p:sldLayoutId id="2147484555" r:id="rId9"/>
   </p:sldLayoutIdLst>
-  <p:transition>
+  <p:transition xmlns:p14="http://schemas.microsoft.com/office/powerpoint/2010/main">
     <p:fade/>
   </p:transition>
   <p:timing>
     <p:tnLst>
       <p:par>
-        <p:cTn id="1" dur="indefinite" restart="never" nodeType="tmRoot"/>
+        <p:cTn xmlns:p14="http://schemas.microsoft.com/office/powerpoint/2010/main" id="1" dur="indefinite" restart="never" nodeType="tmRoot"/>
       </p:par>
     </p:tnLst>
   </p:timing>
@@ -20970,7 +20966,7 @@
   </p:txStyles>
   <p:extLst mod="1">
     <p:ext uri="{27BBF7A9-308A-43DC-89C8-2F10F3537804}">
-      <p15:sldGuideLst xmlns:p15="http://schemas.microsoft.com/office/powerpoint/2012/main">
+      <p15:sldGuideLst xmlns:p15="http://schemas.microsoft.com/office/powerpoint/2012/main" xmlns="">
         <p15:guide id="1" orient="horz" pos="283">
           <p15:clr>
             <a:srgbClr val="F26B43"/>
@@ -21606,13 +21602,13 @@
     <p:sldLayoutId id="2147484549" r:id="rId15"/>
     <p:sldLayoutId id="2147484556" r:id="rId16"/>
   </p:sldLayoutIdLst>
-  <p:transition>
+  <p:transition xmlns:p14="http://schemas.microsoft.com/office/powerpoint/2010/main">
     <p:fade/>
   </p:transition>
   <p:timing>
     <p:tnLst>
       <p:par>
-        <p:cTn id="1" dur="indefinite" restart="never" nodeType="tmRoot"/>
+        <p:cTn xmlns:p14="http://schemas.microsoft.com/office/powerpoint/2010/main" id="1" dur="indefinite" restart="never" nodeType="tmRoot"/>
       </p:par>
     </p:tnLst>
   </p:timing>
@@ -22026,7 +22022,7 @@
   <p:timing>
     <p:tnLst>
       <p:par>
-        <p:cTn id="1" dur="indefinite" restart="never" nodeType="tmRoot"/>
+        <p:cTn xmlns:p14="http://schemas.microsoft.com/office/powerpoint/2010/main" id="1" dur="indefinite" restart="never" nodeType="tmRoot"/>
       </p:par>
     </p:tnLst>
   </p:timing>
@@ -22211,7 +22207,7 @@
   <p:timing>
     <p:tnLst>
       <p:par>
-        <p:cTn id="1" dur="indefinite" restart="never" nodeType="tmRoot"/>
+        <p:cTn xmlns:p14="http://schemas.microsoft.com/office/powerpoint/2010/main" id="1" dur="indefinite" restart="never" nodeType="tmRoot"/>
       </p:par>
     </p:tnLst>
   </p:timing>
@@ -22390,7 +22386,7 @@
   <p:timing>
     <p:tnLst>
       <p:par>
-        <p:cTn id="1" dur="indefinite" restart="never" nodeType="tmRoot"/>
+        <p:cTn xmlns:p14="http://schemas.microsoft.com/office/powerpoint/2010/main" id="1" dur="indefinite" restart="never" nodeType="tmRoot"/>
       </p:par>
     </p:tnLst>
   </p:timing>
@@ -22474,13 +22470,13 @@
   <p:clrMapOvr>
     <a:masterClrMapping/>
   </p:clrMapOvr>
-  <p:transition>
+  <p:transition xmlns:p14="http://schemas.microsoft.com/office/powerpoint/2010/main">
     <p:fade/>
   </p:transition>
   <p:timing>
     <p:tnLst>
       <p:par>
-        <p:cTn id="1" dur="indefinite" restart="never" nodeType="tmRoot"/>
+        <p:cTn xmlns:p14="http://schemas.microsoft.com/office/powerpoint/2010/main" id="1" dur="indefinite" restart="never" nodeType="tmRoot"/>
       </p:par>
     </p:tnLst>
   </p:timing>
@@ -22630,7 +22626,7 @@
   <p:timing>
     <p:tnLst>
       <p:par>
-        <p:cTn id="1" dur="indefinite" restart="never" nodeType="tmRoot"/>
+        <p:cTn xmlns:p14="http://schemas.microsoft.com/office/powerpoint/2010/main" id="1" dur="indefinite" restart="never" nodeType="tmRoot"/>
       </p:par>
     </p:tnLst>
   </p:timing>
@@ -22829,7 +22825,7 @@
   <p:timing>
     <p:tnLst>
       <p:par>
-        <p:cTn id="1" dur="indefinite" restart="never" nodeType="tmRoot"/>
+        <p:cTn xmlns:p14="http://schemas.microsoft.com/office/powerpoint/2010/main" id="1" dur="indefinite" restart="never" nodeType="tmRoot"/>
       </p:par>
     </p:tnLst>
   </p:timing>
@@ -23078,7 +23074,7 @@
   <p:timing>
     <p:tnLst>
       <p:par>
-        <p:cTn id="1" dur="indefinite" restart="never" nodeType="tmRoot"/>
+        <p:cTn xmlns:p14="http://schemas.microsoft.com/office/powerpoint/2010/main" id="1" dur="indefinite" restart="never" nodeType="tmRoot"/>
       </p:par>
     </p:tnLst>
   </p:timing>
@@ -23177,7 +23173,7 @@
   <p:timing>
     <p:tnLst>
       <p:par>
-        <p:cTn id="1" dur="indefinite" restart="never" nodeType="tmRoot"/>
+        <p:cTn xmlns:p14="http://schemas.microsoft.com/office/powerpoint/2010/main" id="1" dur="indefinite" restart="never" nodeType="tmRoot"/>
       </p:par>
     </p:tnLst>
   </p:timing>
@@ -23326,13 +23322,13 @@
   <p:clrMapOvr>
     <a:masterClrMapping/>
   </p:clrMapOvr>
-  <p:transition>
+  <p:transition xmlns:p14="http://schemas.microsoft.com/office/powerpoint/2010/main">
     <p:fade/>
   </p:transition>
   <p:timing>
     <p:tnLst>
       <p:par>
-        <p:cTn id="1" dur="indefinite" restart="never" nodeType="tmRoot"/>
+        <p:cTn xmlns:p14="http://schemas.microsoft.com/office/powerpoint/2010/main" id="1" dur="indefinite" restart="never" nodeType="tmRoot"/>
       </p:par>
     </p:tnLst>
   </p:timing>
@@ -23431,7 +23427,7 @@
   <p:timing>
     <p:tnLst>
       <p:par>
-        <p:cTn id="1" dur="indefinite" restart="never" nodeType="tmRoot"/>
+        <p:cTn xmlns:p14="http://schemas.microsoft.com/office/powerpoint/2010/main" id="1" dur="indefinite" restart="never" nodeType="tmRoot"/>
       </p:par>
     </p:tnLst>
   </p:timing>
@@ -23608,7 +23604,7 @@
   <p:timing>
     <p:tnLst>
       <p:par>
-        <p:cTn id="1" dur="indefinite" restart="never" nodeType="tmRoot"/>
+        <p:cTn xmlns:p14="http://schemas.microsoft.com/office/powerpoint/2010/main" id="1" dur="indefinite" restart="never" nodeType="tmRoot"/>
       </p:par>
     </p:tnLst>
   </p:timing>
@@ -23680,7 +23676,7 @@
                 <a:gridCol w="11448519">
                   <a:extLst>
                     <a:ext uri="{9D8B030D-6E8A-4147-A177-3AD203B41FA5}">
-                      <a16:colId xmlns="" xmlns:a16="http://schemas.microsoft.com/office/drawing/2014/main" val="1253488153"/>
+                      <a16:colId xmlns:a16="http://schemas.microsoft.com/office/drawing/2014/main" xmlns="" val="1253488153"/>
                     </a:ext>
                   </a:extLst>
                 </a:gridCol>
@@ -23702,7 +23698,7 @@
                 </a:tc>
                 <a:extLst>
                   <a:ext uri="{0D108BD9-81ED-4DB2-BD59-A6C34878D82A}">
-                    <a16:rowId xmlns="" xmlns:a16="http://schemas.microsoft.com/office/drawing/2014/main" val="829859176"/>
+                    <a16:rowId xmlns:a16="http://schemas.microsoft.com/office/drawing/2014/main" xmlns="" val="829859176"/>
                   </a:ext>
                 </a:extLst>
               </a:tr>
@@ -23722,7 +23718,7 @@
                 </a:tc>
                 <a:extLst>
                   <a:ext uri="{0D108BD9-81ED-4DB2-BD59-A6C34878D82A}">
-                    <a16:rowId xmlns="" xmlns:a16="http://schemas.microsoft.com/office/drawing/2014/main" val="1946132611"/>
+                    <a16:rowId xmlns:a16="http://schemas.microsoft.com/office/drawing/2014/main" xmlns="" val="1946132611"/>
                   </a:ext>
                 </a:extLst>
               </a:tr>
@@ -23759,7 +23755,7 @@
                 </a:tc>
                 <a:extLst>
                   <a:ext uri="{0D108BD9-81ED-4DB2-BD59-A6C34878D82A}">
-                    <a16:rowId xmlns="" xmlns:a16="http://schemas.microsoft.com/office/drawing/2014/main" val="3204002662"/>
+                    <a16:rowId xmlns:a16="http://schemas.microsoft.com/office/drawing/2014/main" xmlns="" val="3204002662"/>
                   </a:ext>
                 </a:extLst>
               </a:tr>
@@ -23796,7 +23792,7 @@
                 </a:tc>
                 <a:extLst>
                   <a:ext uri="{0D108BD9-81ED-4DB2-BD59-A6C34878D82A}">
-                    <a16:rowId xmlns="" xmlns:a16="http://schemas.microsoft.com/office/drawing/2014/main" val="4266278162"/>
+                    <a16:rowId xmlns:a16="http://schemas.microsoft.com/office/drawing/2014/main" xmlns="" val="4266278162"/>
                   </a:ext>
                 </a:extLst>
               </a:tr>
@@ -23882,13 +23878,13 @@
   <p:clrMapOvr>
     <a:masterClrMapping/>
   </p:clrMapOvr>
-  <p:transition>
+  <p:transition xmlns:p14="http://schemas.microsoft.com/office/powerpoint/2010/main">
     <p:fade/>
   </p:transition>
   <p:timing>
     <p:tnLst>
       <p:par>
-        <p:cTn id="1" dur="indefinite" restart="never" nodeType="tmRoot"/>
+        <p:cTn xmlns:p14="http://schemas.microsoft.com/office/powerpoint/2010/main" id="1" dur="indefinite" restart="never" nodeType="tmRoot"/>
       </p:par>
     </p:tnLst>
   </p:timing>
@@ -24024,7 +24020,7 @@
   <p:timing>
     <p:tnLst>
       <p:par>
-        <p:cTn id="1" dur="indefinite" restart="never" nodeType="tmRoot"/>
+        <p:cTn xmlns:p14="http://schemas.microsoft.com/office/powerpoint/2010/main" id="1" dur="indefinite" restart="never" nodeType="tmRoot"/>
       </p:par>
     </p:tnLst>
   </p:timing>
@@ -24123,7 +24119,7 @@
   <p:timing>
     <p:tnLst>
       <p:par>
-        <p:cTn id="1" dur="indefinite" restart="never" nodeType="tmRoot"/>
+        <p:cTn xmlns:p14="http://schemas.microsoft.com/office/powerpoint/2010/main" id="1" dur="indefinite" restart="never" nodeType="tmRoot"/>
       </p:par>
     </p:tnLst>
   </p:timing>
@@ -24265,7 +24261,7 @@
   <p:timing>
     <p:tnLst>
       <p:par>
-        <p:cTn id="1" dur="indefinite" restart="never" nodeType="tmRoot"/>
+        <p:cTn xmlns:p14="http://schemas.microsoft.com/office/powerpoint/2010/main" id="1" dur="indefinite" restart="never" nodeType="tmRoot"/>
       </p:par>
     </p:tnLst>
   </p:timing>
@@ -24273,7 +24269,7 @@
 </file>
 
 <file path=ppt/slides/slide23.xml><?xml version="1.0" encoding="utf-8"?>
-<p:sld xmlns:a="http://schemas.openxmlformats.org/drawingml/2006/main" xmlns:r="http://schemas.openxmlformats.org/officeDocument/2006/relationships" xmlns:p="http://schemas.openxmlformats.org/presentationml/2006/main">
+<p:sld xmlns:a="http://schemas.openxmlformats.org/drawingml/2006/main" xmlns:r="http://schemas.openxmlformats.org/officeDocument/2006/relationships" xmlns:p="http://schemas.openxmlformats.org/presentationml/2006/main" show="0">
   <p:cSld>
     <p:spTree>
       <p:nvGrpSpPr>
@@ -24348,13 +24344,13 @@
   <p:clrMapOvr>
     <a:masterClrMapping/>
   </p:clrMapOvr>
-  <p:transition>
+  <p:transition xmlns:p14="http://schemas.microsoft.com/office/powerpoint/2010/main">
     <p:fade/>
   </p:transition>
   <p:timing>
     <p:tnLst>
       <p:par>
-        <p:cTn id="1" dur="indefinite" restart="never" nodeType="tmRoot"/>
+        <p:cTn xmlns:p14="http://schemas.microsoft.com/office/powerpoint/2010/main" id="1" dur="indefinite" restart="never" nodeType="tmRoot"/>
       </p:par>
     </p:tnLst>
   </p:timing>
@@ -24438,13 +24434,13 @@
   <p:clrMapOvr>
     <a:masterClrMapping/>
   </p:clrMapOvr>
-  <p:transition>
+  <p:transition xmlns:p14="http://schemas.microsoft.com/office/powerpoint/2010/main">
     <p:fade/>
   </p:transition>
   <p:timing>
     <p:tnLst>
       <p:par>
-        <p:cTn id="1" dur="indefinite" restart="never" nodeType="tmRoot"/>
+        <p:cTn xmlns:p14="http://schemas.microsoft.com/office/powerpoint/2010/main" id="1" dur="indefinite" restart="never" nodeType="tmRoot"/>
       </p:par>
     </p:tnLst>
   </p:timing>
@@ -24561,18 +24557,18 @@
   <p:clrMapOvr>
     <a:masterClrMapping/>
   </p:clrMapOvr>
-  <mc:AlternateContent xmlns:mc="http://schemas.openxmlformats.org/markup-compatibility/2006">
-    <mc:Choice xmlns:p14="http://schemas.microsoft.com/office/powerpoint/2010/main" Requires="p14">
+  <mc:AlternateContent xmlns:mc="http://schemas.openxmlformats.org/markup-compatibility/2006" xmlns:p14="http://schemas.microsoft.com/office/powerpoint/2010/main">
+    <mc:Choice Requires="p14">
       <p:transition p14:dur="0"/>
     </mc:Choice>
-    <mc:Fallback>
+    <mc:Fallback xmlns="">
       <p:transition/>
     </mc:Fallback>
   </mc:AlternateContent>
   <p:timing>
     <p:tnLst>
       <p:par>
-        <p:cTn id="1" dur="indefinite" restart="never" nodeType="tmRoot"/>
+        <p:cTn xmlns:p14="http://schemas.microsoft.com/office/powerpoint/2010/main" id="1" dur="indefinite" restart="never" nodeType="tmRoot"/>
       </p:par>
     </p:tnLst>
   </p:timing>
@@ -24814,13 +24810,13 @@
   <p:clrMapOvr>
     <a:masterClrMapping/>
   </p:clrMapOvr>
-  <p:transition>
+  <p:transition xmlns:p14="http://schemas.microsoft.com/office/powerpoint/2010/main">
     <p:fade/>
   </p:transition>
   <p:timing>
     <p:tnLst>
       <p:par>
-        <p:cTn id="1" dur="indefinite" restart="never" nodeType="tmRoot"/>
+        <p:cTn xmlns:p14="http://schemas.microsoft.com/office/powerpoint/2010/main" id="1" dur="indefinite" restart="never" nodeType="tmRoot"/>
       </p:par>
     </p:tnLst>
   </p:timing>
@@ -24974,13 +24970,13 @@
   <p:clrMapOvr>
     <a:masterClrMapping/>
   </p:clrMapOvr>
-  <p:transition>
+  <p:transition xmlns:p14="http://schemas.microsoft.com/office/powerpoint/2010/main">
     <p:fade/>
   </p:transition>
   <p:timing>
     <p:tnLst>
       <p:par>
-        <p:cTn id="1" dur="indefinite" restart="never" nodeType="tmRoot"/>
+        <p:cTn xmlns:p14="http://schemas.microsoft.com/office/powerpoint/2010/main" id="1" dur="indefinite" restart="never" nodeType="tmRoot"/>
       </p:par>
     </p:tnLst>
   </p:timing>
@@ -24988,7 +24984,7 @@
 </file>
 
 <file path=ppt/slides/slide28.xml><?xml version="1.0" encoding="utf-8"?>
-<p:sld xmlns:a="http://schemas.openxmlformats.org/drawingml/2006/main" xmlns:r="http://schemas.openxmlformats.org/officeDocument/2006/relationships" xmlns:p="http://schemas.openxmlformats.org/presentationml/2006/main">
+<p:sld xmlns:a="http://schemas.openxmlformats.org/drawingml/2006/main" xmlns:r="http://schemas.openxmlformats.org/officeDocument/2006/relationships" xmlns:p="http://schemas.openxmlformats.org/presentationml/2006/main" show="0">
   <p:cSld>
     <p:spTree>
       <p:nvGrpSpPr>
@@ -25067,13 +25063,13 @@
   <p:clrMapOvr>
     <a:masterClrMapping/>
   </p:clrMapOvr>
-  <p:transition>
+  <p:transition xmlns:p14="http://schemas.microsoft.com/office/powerpoint/2010/main">
     <p:fade/>
   </p:transition>
   <p:timing>
     <p:tnLst>
       <p:par>
-        <p:cTn id="1" dur="indefinite" restart="never" nodeType="tmRoot"/>
+        <p:cTn xmlns:p14="http://schemas.microsoft.com/office/powerpoint/2010/main" id="1" dur="indefinite" restart="never" nodeType="tmRoot"/>
       </p:par>
     </p:tnLst>
   </p:timing>
@@ -25216,7 +25212,7 @@
   <p:timing>
     <p:tnLst>
       <p:par>
-        <p:cTn id="1" dur="indefinite" restart="never" nodeType="tmRoot"/>
+        <p:cTn xmlns:p14="http://schemas.microsoft.com/office/powerpoint/2010/main" id="1" dur="indefinite" restart="never" nodeType="tmRoot"/>
       </p:par>
     </p:tnLst>
   </p:timing>
@@ -25312,13 +25308,13 @@
   <p:clrMapOvr>
     <a:masterClrMapping/>
   </p:clrMapOvr>
-  <p:transition>
+  <p:transition xmlns:p14="http://schemas.microsoft.com/office/powerpoint/2010/main">
     <p:fade/>
   </p:transition>
   <p:timing>
     <p:tnLst>
       <p:par>
-        <p:cTn id="1" dur="indefinite" restart="never" nodeType="tmRoot"/>
+        <p:cTn xmlns:p14="http://schemas.microsoft.com/office/powerpoint/2010/main" id="1" dur="indefinite" restart="never" nodeType="tmRoot"/>
       </p:par>
     </p:tnLst>
   </p:timing>
@@ -25513,7 +25509,7 @@
   <p:timing>
     <p:tnLst>
       <p:par>
-        <p:cTn id="1" dur="indefinite" restart="never" nodeType="tmRoot"/>
+        <p:cTn xmlns:p14="http://schemas.microsoft.com/office/powerpoint/2010/main" id="1" dur="indefinite" restart="never" nodeType="tmRoot"/>
       </p:par>
     </p:tnLst>
   </p:timing>
@@ -25656,7 +25652,7 @@
   <p:timing>
     <p:tnLst>
       <p:par>
-        <p:cTn id="1" dur="indefinite" restart="never" nodeType="tmRoot"/>
+        <p:cTn xmlns:p14="http://schemas.microsoft.com/office/powerpoint/2010/main" id="1" dur="indefinite" restart="never" nodeType="tmRoot"/>
       </p:par>
     </p:tnLst>
   </p:timing>
@@ -25733,13 +25729,13 @@
   <p:clrMapOvr>
     <a:masterClrMapping/>
   </p:clrMapOvr>
-  <p:transition>
+  <p:transition xmlns:p14="http://schemas.microsoft.com/office/powerpoint/2010/main">
     <p:fade/>
   </p:transition>
   <p:timing>
     <p:tnLst>
       <p:par>
-        <p:cTn id="1" dur="indefinite" restart="never" nodeType="tmRoot"/>
+        <p:cTn xmlns:p14="http://schemas.microsoft.com/office/powerpoint/2010/main" id="1" dur="indefinite" restart="never" nodeType="tmRoot"/>
       </p:par>
     </p:tnLst>
   </p:timing>
@@ -25909,7 +25905,7 @@
   <p:timing>
     <p:tnLst>
       <p:par>
-        <p:cTn id="1" dur="indefinite" restart="never" nodeType="tmRoot"/>
+        <p:cTn xmlns:p14="http://schemas.microsoft.com/office/powerpoint/2010/main" id="1" dur="indefinite" restart="never" nodeType="tmRoot"/>
       </p:par>
     </p:tnLst>
   </p:timing>
@@ -26038,14 +26034,14 @@
           </a:ln>
           <a:effectLst/>
           <a:extLst>
-            <a:ext uri="{909E8E84-426E-40DD-AFC4-6F175D3DCCD1}">
+            <a:ext uri="{909E8E84-426E-40dd-AFC4-6F175D3DCCD1}">
               <a14:hiddenFill xmlns:a14="http://schemas.microsoft.com/office/drawing/2010/main">
                 <a:solidFill>
                   <a:schemeClr val="accent1"/>
                 </a:solidFill>
               </a14:hiddenFill>
             </a:ext>
-            <a:ext uri="{91240B29-F687-4F45-9708-019B960494DF}">
+            <a:ext uri="{91240B29-F687-4f45-9708-019B960494DF}">
               <a14:hiddenLine xmlns:a14="http://schemas.microsoft.com/office/drawing/2010/main" w="9525">
                 <a:solidFill>
                   <a:schemeClr val="tx1"/>
@@ -26055,7 +26051,7 @@
                 <a:tailEnd/>
               </a14:hiddenLine>
             </a:ext>
-            <a:ext uri="{AF507438-7753-43E0-B8FC-AC1667EBCBE1}">
+            <a:ext uri="{AF507438-7753-43e0-B8FC-AC1667EBCBE1}">
               <a14:hiddenEffects xmlns:a14="http://schemas.microsoft.com/office/drawing/2010/main">
                 <a:effectLst>
                   <a:outerShdw dist="35921" dir="2700000" algn="ctr" rotWithShape="0">
@@ -26101,14 +26097,14 @@
           </a:ln>
           <a:effectLst/>
           <a:extLst>
-            <a:ext uri="{909E8E84-426E-40DD-AFC4-6F175D3DCCD1}">
+            <a:ext uri="{909E8E84-426E-40dd-AFC4-6F175D3DCCD1}">
               <a14:hiddenFill xmlns:a14="http://schemas.microsoft.com/office/drawing/2010/main">
                 <a:solidFill>
                   <a:schemeClr val="accent1"/>
                 </a:solidFill>
               </a14:hiddenFill>
             </a:ext>
-            <a:ext uri="{91240B29-F687-4F45-9708-019B960494DF}">
+            <a:ext uri="{91240B29-F687-4f45-9708-019B960494DF}">
               <a14:hiddenLine xmlns:a14="http://schemas.microsoft.com/office/drawing/2010/main" w="9525">
                 <a:solidFill>
                   <a:schemeClr val="tx1"/>
@@ -26118,7 +26114,7 @@
                 <a:tailEnd/>
               </a14:hiddenLine>
             </a:ext>
-            <a:ext uri="{AF507438-7753-43E0-B8FC-AC1667EBCBE1}">
+            <a:ext uri="{AF507438-7753-43e0-B8FC-AC1667EBCBE1}">
               <a14:hiddenEffects xmlns:a14="http://schemas.microsoft.com/office/drawing/2010/main">
                 <a:effectLst>
                   <a:outerShdw dist="35921" dir="2700000" algn="ctr" rotWithShape="0">
@@ -26191,14 +26187,14 @@
             </a:ln>
             <a:effectLst/>
             <a:extLst>
-              <a:ext uri="{909E8E84-426E-40DD-AFC4-6F175D3DCCD1}">
+              <a:ext uri="{909E8E84-426E-40dd-AFC4-6F175D3DCCD1}">
                 <a14:hiddenFill xmlns:a14="http://schemas.microsoft.com/office/drawing/2010/main">
                   <a:solidFill>
                     <a:schemeClr val="accent1"/>
                   </a:solidFill>
                 </a14:hiddenFill>
               </a:ext>
-              <a:ext uri="{91240B29-F687-4F45-9708-019B960494DF}">
+              <a:ext uri="{91240B29-F687-4f45-9708-019B960494DF}">
                 <a14:hiddenLine xmlns:a14="http://schemas.microsoft.com/office/drawing/2010/main" w="9525">
                   <a:solidFill>
                     <a:schemeClr val="tx1"/>
@@ -26208,7 +26204,7 @@
                   <a:tailEnd/>
                 </a14:hiddenLine>
               </a:ext>
-              <a:ext uri="{AF507438-7753-43E0-B8FC-AC1667EBCBE1}">
+              <a:ext uri="{AF507438-7753-43e0-B8FC-AC1667EBCBE1}">
                 <a14:hiddenEffects xmlns:a14="http://schemas.microsoft.com/office/drawing/2010/main">
                   <a:effectLst>
                     <a:outerShdw dist="35921" dir="2700000" algn="ctr" rotWithShape="0">
@@ -26255,14 +26251,14 @@
             </a:ln>
             <a:effectLst/>
             <a:extLst>
-              <a:ext uri="{909E8E84-426E-40DD-AFC4-6F175D3DCCD1}">
+              <a:ext uri="{909E8E84-426E-40dd-AFC4-6F175D3DCCD1}">
                 <a14:hiddenFill xmlns:a14="http://schemas.microsoft.com/office/drawing/2010/main">
                   <a:solidFill>
                     <a:schemeClr val="accent1"/>
                   </a:solidFill>
                 </a14:hiddenFill>
               </a:ext>
-              <a:ext uri="{91240B29-F687-4F45-9708-019B960494DF}">
+              <a:ext uri="{91240B29-F687-4f45-9708-019B960494DF}">
                 <a14:hiddenLine xmlns:a14="http://schemas.microsoft.com/office/drawing/2010/main" w="9525">
                   <a:solidFill>
                     <a:schemeClr val="tx1"/>
@@ -26272,7 +26268,7 @@
                   <a:tailEnd/>
                 </a14:hiddenLine>
               </a:ext>
-              <a:ext uri="{AF507438-7753-43E0-B8FC-AC1667EBCBE1}">
+              <a:ext uri="{AF507438-7753-43e0-B8FC-AC1667EBCBE1}">
                 <a14:hiddenEffects xmlns:a14="http://schemas.microsoft.com/office/drawing/2010/main">
                   <a:effectLst>
                     <a:outerShdw dist="35921" dir="2700000" algn="ctr" rotWithShape="0">
@@ -26319,14 +26315,14 @@
             </a:ln>
             <a:effectLst/>
             <a:extLst>
-              <a:ext uri="{909E8E84-426E-40DD-AFC4-6F175D3DCCD1}">
+              <a:ext uri="{909E8E84-426E-40dd-AFC4-6F175D3DCCD1}">
                 <a14:hiddenFill xmlns:a14="http://schemas.microsoft.com/office/drawing/2010/main">
                   <a:solidFill>
                     <a:schemeClr val="accent1"/>
                   </a:solidFill>
                 </a14:hiddenFill>
               </a:ext>
-              <a:ext uri="{91240B29-F687-4F45-9708-019B960494DF}">
+              <a:ext uri="{91240B29-F687-4f45-9708-019B960494DF}">
                 <a14:hiddenLine xmlns:a14="http://schemas.microsoft.com/office/drawing/2010/main" w="9525">
                   <a:solidFill>
                     <a:schemeClr val="tx1"/>
@@ -26336,7 +26332,7 @@
                   <a:tailEnd/>
                 </a14:hiddenLine>
               </a:ext>
-              <a:ext uri="{AF507438-7753-43E0-B8FC-AC1667EBCBE1}">
+              <a:ext uri="{AF507438-7753-43e0-B8FC-AC1667EBCBE1}">
                 <a14:hiddenEffects xmlns:a14="http://schemas.microsoft.com/office/drawing/2010/main">
                   <a:effectLst>
                     <a:outerShdw dist="35921" dir="2700000" algn="ctr" rotWithShape="0">
@@ -26370,7 +26366,7 @@
   <p:timing>
     <p:tnLst>
       <p:par>
-        <p:cTn id="1" dur="indefinite" restart="never" nodeType="tmRoot"/>
+        <p:cTn xmlns:p14="http://schemas.microsoft.com/office/powerpoint/2010/main" id="1" dur="indefinite" restart="never" nodeType="tmRoot"/>
       </p:par>
     </p:tnLst>
   </p:timing>
@@ -26531,7 +26527,7 @@
   <p:timing>
     <p:tnLst>
       <p:par>
-        <p:cTn id="1" dur="indefinite" restart="never" nodeType="tmRoot"/>
+        <p:cTn xmlns:p14="http://schemas.microsoft.com/office/powerpoint/2010/main" id="1" dur="indefinite" restart="never" nodeType="tmRoot"/>
       </p:par>
     </p:tnLst>
   </p:timing>
@@ -27264,7 +27260,7 @@
   <p:timing>
     <p:tnLst>
       <p:par>
-        <p:cTn id="1" dur="indefinite" restart="never" nodeType="tmRoot"/>
+        <p:cTn xmlns:p14="http://schemas.microsoft.com/office/powerpoint/2010/main" id="1" dur="indefinite" restart="never" nodeType="tmRoot"/>
       </p:par>
     </p:tnLst>
   </p:timing>
@@ -27558,7 +27554,7 @@
   <a:extraClrSchemeLst/>
   <a:extLst>
     <a:ext uri="{05A4C25C-085E-4340-85A3-A5531E510DB2}">
-      <thm15:themeFamily xmlns:thm15="http://schemas.microsoft.com/office/thememl/2012/main" name="Office_Template_16x9_WHITE.potx" id="{BAC85760-2BE3-4369-8D6A-792FA239637A}" vid="{0B6ECECE-D832-4A6D-9382-4D4E764C03DC}"/>
+      <thm15:themeFamily xmlns:thm15="http://schemas.microsoft.com/office/thememl/2012/main" xmlns="" name="Office_Template_16x9_WHITE.potx" id="{BAC85760-2BE3-4369-8D6A-792FA239637A}" vid="{0B6ECECE-D832-4A6D-9382-4D4E764C03DC}"/>
     </a:ext>
   </a:extLst>
 </a:theme>
@@ -27860,7 +27856,7 @@
   <a:extraClrSchemeLst/>
   <a:extLst>
     <a:ext uri="{05A4C25C-085E-4340-85A3-A5531E510DB2}">
-      <thm15:themeFamily xmlns:thm15="http://schemas.microsoft.com/office/thememl/2012/main" name="TENA14Speaker_PPT_Template [Read-Only]" id="{2A7DA4F6-E863-44BA-B064-9E5DF871FA15}" vid="{CA2D5409-25F5-4284-AE71-EC20238C5228}"/>
+      <thm15:themeFamily xmlns:thm15="http://schemas.microsoft.com/office/thememl/2012/main" xmlns="" name="TENA14Speaker_PPT_Template [Read-Only]" id="{2A7DA4F6-E863-44BA-B064-9E5DF871FA15}" vid="{CA2D5409-25F5-4284-AE71-EC20238C5228}"/>
     </a:ext>
   </a:extLst>
 </a:theme>
@@ -28153,7 +28149,7 @@
   <a:extraClrSchemeLst/>
   <a:extLst>
     <a:ext uri="{05A4C25C-085E-4340-85A3-A5531E510DB2}">
-      <thm15:themeFamily xmlns:thm15="http://schemas.microsoft.com/office/thememl/2012/main" name="Office_Template_16x9_WHITE.potx" id="{BAC85760-2BE3-4369-8D6A-792FA239637A}" vid="{0B6ECECE-D832-4A6D-9382-4D4E764C03DC}"/>
+      <thm15:themeFamily xmlns:thm15="http://schemas.microsoft.com/office/thememl/2012/main" xmlns="" name="Office_Template_16x9_WHITE.potx" id="{BAC85760-2BE3-4369-8D6A-792FA239637A}" vid="{0B6ECECE-D832-4A6D-9382-4D4E764C03DC}"/>
     </a:ext>
   </a:extLst>
 </a:theme>

</xml_diff>